<commit_message>
feat(entities-dto): modify entity and dto fields
- Updated Album and DTO fields for image storage and metadata management.
- Added ArtistRequest entity
- Implemented S3 storage integration
</commit_message>
<xml_diff>
--- a/viewDesignSketches.pptx
+++ b/viewDesignSketches.pptx
@@ -217,7 +217,7 @@
           <a:p>
             <a:fld id="{BE985D28-3B0A-42E0-BE9B-05472A281DFA}" type="datetimeFigureOut">
               <a:rPr lang="en-US" smtClean="0"/>
-              <a:t>11/7/2024</a:t>
+              <a:t>11/16/2024</a:t>
             </a:fld>
             <a:endParaRPr lang="en-US"/>
           </a:p>
@@ -631,7 +631,7 @@
           <a:p>
             <a:fld id="{07096713-FB4A-4B90-A618-3CE2391E76AF}" type="datetimeFigureOut">
               <a:rPr lang="en-US" smtClean="0"/>
-              <a:t>11/7/2024</a:t>
+              <a:t>11/16/2024</a:t>
             </a:fld>
             <a:endParaRPr lang="en-US"/>
           </a:p>
@@ -829,7 +829,7 @@
           <a:p>
             <a:fld id="{07096713-FB4A-4B90-A618-3CE2391E76AF}" type="datetimeFigureOut">
               <a:rPr lang="en-US" smtClean="0"/>
-              <a:t>11/7/2024</a:t>
+              <a:t>11/16/2024</a:t>
             </a:fld>
             <a:endParaRPr lang="en-US"/>
           </a:p>
@@ -1037,7 +1037,7 @@
           <a:p>
             <a:fld id="{07096713-FB4A-4B90-A618-3CE2391E76AF}" type="datetimeFigureOut">
               <a:rPr lang="en-US" smtClean="0"/>
-              <a:t>11/7/2024</a:t>
+              <a:t>11/16/2024</a:t>
             </a:fld>
             <a:endParaRPr lang="en-US"/>
           </a:p>
@@ -1235,7 +1235,7 @@
           <a:p>
             <a:fld id="{07096713-FB4A-4B90-A618-3CE2391E76AF}" type="datetimeFigureOut">
               <a:rPr lang="en-US" smtClean="0"/>
-              <a:t>11/7/2024</a:t>
+              <a:t>11/16/2024</a:t>
             </a:fld>
             <a:endParaRPr lang="en-US"/>
           </a:p>
@@ -1510,7 +1510,7 @@
           <a:p>
             <a:fld id="{07096713-FB4A-4B90-A618-3CE2391E76AF}" type="datetimeFigureOut">
               <a:rPr lang="en-US" smtClean="0"/>
-              <a:t>11/7/2024</a:t>
+              <a:t>11/16/2024</a:t>
             </a:fld>
             <a:endParaRPr lang="en-US"/>
           </a:p>
@@ -1775,7 +1775,7 @@
           <a:p>
             <a:fld id="{07096713-FB4A-4B90-A618-3CE2391E76AF}" type="datetimeFigureOut">
               <a:rPr lang="en-US" smtClean="0"/>
-              <a:t>11/7/2024</a:t>
+              <a:t>11/16/2024</a:t>
             </a:fld>
             <a:endParaRPr lang="en-US"/>
           </a:p>
@@ -2187,7 +2187,7 @@
           <a:p>
             <a:fld id="{07096713-FB4A-4B90-A618-3CE2391E76AF}" type="datetimeFigureOut">
               <a:rPr lang="en-US" smtClean="0"/>
-              <a:t>11/7/2024</a:t>
+              <a:t>11/16/2024</a:t>
             </a:fld>
             <a:endParaRPr lang="en-US"/>
           </a:p>
@@ -2328,7 +2328,7 @@
           <a:p>
             <a:fld id="{07096713-FB4A-4B90-A618-3CE2391E76AF}" type="datetimeFigureOut">
               <a:rPr lang="en-US" smtClean="0"/>
-              <a:t>11/7/2024</a:t>
+              <a:t>11/16/2024</a:t>
             </a:fld>
             <a:endParaRPr lang="en-US"/>
           </a:p>
@@ -2441,7 +2441,7 @@
           <a:p>
             <a:fld id="{07096713-FB4A-4B90-A618-3CE2391E76AF}" type="datetimeFigureOut">
               <a:rPr lang="en-US" smtClean="0"/>
-              <a:t>11/7/2024</a:t>
+              <a:t>11/16/2024</a:t>
             </a:fld>
             <a:endParaRPr lang="en-US"/>
           </a:p>
@@ -2752,7 +2752,7 @@
           <a:p>
             <a:fld id="{07096713-FB4A-4B90-A618-3CE2391E76AF}" type="datetimeFigureOut">
               <a:rPr lang="en-US" smtClean="0"/>
-              <a:t>11/7/2024</a:t>
+              <a:t>11/16/2024</a:t>
             </a:fld>
             <a:endParaRPr lang="en-US"/>
           </a:p>
@@ -3040,7 +3040,7 @@
           <a:p>
             <a:fld id="{07096713-FB4A-4B90-A618-3CE2391E76AF}" type="datetimeFigureOut">
               <a:rPr lang="en-US" smtClean="0"/>
-              <a:t>11/7/2024</a:t>
+              <a:t>11/16/2024</a:t>
             </a:fld>
             <a:endParaRPr lang="en-US"/>
           </a:p>
@@ -3281,7 +3281,7 @@
           <a:p>
             <a:fld id="{07096713-FB4A-4B90-A618-3CE2391E76AF}" type="datetimeFigureOut">
               <a:rPr lang="en-US" smtClean="0"/>
-              <a:t>11/7/2024</a:t>
+              <a:t>11/16/2024</a:t>
             </a:fld>
             <a:endParaRPr lang="en-US"/>
           </a:p>
@@ -43023,8 +43023,8 @@
         </p:nvSpPr>
         <p:spPr>
           <a:xfrm>
-            <a:off x="387598" y="5168822"/>
-            <a:ext cx="3679808" cy="338554"/>
+            <a:off x="2443015" y="2221666"/>
+            <a:ext cx="3679808" cy="584775"/>
           </a:xfrm>
           <a:prstGeom prst="rect">
             <a:avLst/>
@@ -43036,6 +43036,9 @@
             <a:spAutoFit/>
           </a:bodyPr>
           <a:lstStyle/>
+          <a:p>
+            <a:endParaRPr lang="en-US" altLang="ko-KR" sz="1600" b="1" dirty="0"/>
+          </a:p>
           <a:p>
             <a:r>
               <a:rPr lang="ko-KR" altLang="en-US" sz="1600" b="1" dirty="0"/>
@@ -43062,7 +43065,7 @@
         </p:nvSpPr>
         <p:spPr>
           <a:xfrm>
-            <a:off x="523105" y="3640096"/>
+            <a:off x="523105" y="3776502"/>
             <a:ext cx="1934678" cy="276999"/>
           </a:xfrm>
           <a:prstGeom prst="rect">
@@ -43099,10 +43102,10 @@
         </p:nvGrpSpPr>
         <p:grpSpPr>
           <a:xfrm>
-            <a:off x="957691" y="4155503"/>
-            <a:ext cx="2122887" cy="261610"/>
-            <a:chOff x="1030843" y="4091506"/>
-            <a:chExt cx="2122887" cy="261610"/>
+            <a:off x="1060790" y="3381210"/>
+            <a:ext cx="2027051" cy="261610"/>
+            <a:chOff x="1126679" y="4091506"/>
+            <a:chExt cx="2027051" cy="261610"/>
           </a:xfrm>
         </p:grpSpPr>
         <p:pic>
@@ -43134,8 +43137,8 @@
           </p:blipFill>
           <p:spPr bwMode="auto">
             <a:xfrm>
-              <a:off x="1030843" y="4146889"/>
-              <a:ext cx="191886" cy="191886"/>
+              <a:off x="1126679" y="4176773"/>
+              <a:ext cx="131502" cy="131502"/>
             </a:xfrm>
             <a:prstGeom prst="rect">
               <a:avLst/>
@@ -43687,6 +43690,91 @@
           </a:prstGeom>
         </p:spPr>
       </p:pic>
+      <p:sp>
+        <p:nvSpPr>
+          <p:cNvPr id="2" name="TextBox 1">
+            <a:extLst>
+              <a:ext uri="{FF2B5EF4-FFF2-40B4-BE49-F238E27FC236}">
+                <a16:creationId xmlns:a16="http://schemas.microsoft.com/office/drawing/2014/main" id="{7415BCE3-D031-537F-B47F-89D21A2D152A}"/>
+              </a:ext>
+            </a:extLst>
+          </p:cNvPr>
+          <p:cNvSpPr txBox="1"/>
+          <p:nvPr/>
+        </p:nvSpPr>
+        <p:spPr>
+          <a:xfrm>
+            <a:off x="2630316" y="785888"/>
+            <a:ext cx="3679808" cy="1077218"/>
+          </a:xfrm>
+          <a:prstGeom prst="rect">
+            <a:avLst/>
+          </a:prstGeom>
+          <a:noFill/>
+        </p:spPr>
+        <p:txBody>
+          <a:bodyPr wrap="square" rtlCol="0">
+            <a:spAutoFit/>
+          </a:bodyPr>
+          <a:lstStyle/>
+          <a:p>
+            <a:endParaRPr lang="en-US" altLang="ko-KR" sz="3200" b="1" dirty="0"/>
+          </a:p>
+          <a:p>
+            <a:r>
+              <a:rPr lang="en-US" altLang="ko-KR" sz="3200" b="1" dirty="0"/>
+              <a:t>10	5</a:t>
+            </a:r>
+          </a:p>
+        </p:txBody>
+      </p:sp>
+      <p:sp>
+        <p:nvSpPr>
+          <p:cNvPr id="5" name="TextBox 4">
+            <a:extLst>
+              <a:ext uri="{FF2B5EF4-FFF2-40B4-BE49-F238E27FC236}">
+                <a16:creationId xmlns:a16="http://schemas.microsoft.com/office/drawing/2014/main" id="{EE06BD0B-737E-4F3C-6CC2-B2C884FA22BA}"/>
+              </a:ext>
+            </a:extLst>
+          </p:cNvPr>
+          <p:cNvSpPr txBox="1"/>
+          <p:nvPr/>
+        </p:nvSpPr>
+        <p:spPr>
+          <a:xfrm>
+            <a:off x="2617599" y="1647662"/>
+            <a:ext cx="3679808" cy="430887"/>
+          </a:xfrm>
+          <a:prstGeom prst="rect">
+            <a:avLst/>
+          </a:prstGeom>
+          <a:noFill/>
+        </p:spPr>
+        <p:txBody>
+          <a:bodyPr wrap="square" rtlCol="0">
+            <a:spAutoFit/>
+          </a:bodyPr>
+          <a:lstStyle/>
+          <a:p>
+            <a:endParaRPr lang="en-US" altLang="ko-KR" sz="1100" dirty="0"/>
+          </a:p>
+          <a:p>
+            <a:r>
+              <a:rPr lang="ko-KR" altLang="en-US" sz="1100" dirty="0" err="1"/>
+              <a:t>팔로워</a:t>
+            </a:r>
+            <a:r>
+              <a:rPr lang="en-US" altLang="ko-KR" sz="1100" dirty="0"/>
+              <a:t>             </a:t>
+            </a:r>
+            <a:r>
+              <a:rPr lang="ko-KR" altLang="en-US" sz="1100" dirty="0" err="1"/>
+              <a:t>팔로잉</a:t>
+            </a:r>
+            <a:endParaRPr lang="en-US" altLang="ko-KR" sz="1100" dirty="0"/>
+          </a:p>
+        </p:txBody>
+      </p:sp>
     </p:spTree>
     <p:extLst>
       <p:ext uri="{BB962C8B-B14F-4D97-AF65-F5344CB8AC3E}">

</xml_diff>

<commit_message>
feat(security): implement Spring Security with configuration and handlers feat(entity): create Announcement, Feedback, and Role entities with DTOs feat(service): implement AuthService and UserService feat(repository): add AnnouncementRepository and RoleRepository feat(view): implement login, register, registerConfirmed, and support page templates
</commit_message>
<xml_diff>
--- a/viewDesignSketches.pptx
+++ b/viewDesignSketches.pptx
@@ -217,7 +217,7 @@
           <a:p>
             <a:fld id="{BE985D28-3B0A-42E0-BE9B-05472A281DFA}" type="datetimeFigureOut">
               <a:rPr lang="en-US" smtClean="0"/>
-              <a:t>11/16/2024</a:t>
+              <a:t>11/20/2024</a:t>
             </a:fld>
             <a:endParaRPr lang="en-US"/>
           </a:p>
@@ -631,7 +631,7 @@
           <a:p>
             <a:fld id="{07096713-FB4A-4B90-A618-3CE2391E76AF}" type="datetimeFigureOut">
               <a:rPr lang="en-US" smtClean="0"/>
-              <a:t>11/16/2024</a:t>
+              <a:t>11/20/2024</a:t>
             </a:fld>
             <a:endParaRPr lang="en-US"/>
           </a:p>
@@ -829,7 +829,7 @@
           <a:p>
             <a:fld id="{07096713-FB4A-4B90-A618-3CE2391E76AF}" type="datetimeFigureOut">
               <a:rPr lang="en-US" smtClean="0"/>
-              <a:t>11/16/2024</a:t>
+              <a:t>11/20/2024</a:t>
             </a:fld>
             <a:endParaRPr lang="en-US"/>
           </a:p>
@@ -1037,7 +1037,7 @@
           <a:p>
             <a:fld id="{07096713-FB4A-4B90-A618-3CE2391E76AF}" type="datetimeFigureOut">
               <a:rPr lang="en-US" smtClean="0"/>
-              <a:t>11/16/2024</a:t>
+              <a:t>11/20/2024</a:t>
             </a:fld>
             <a:endParaRPr lang="en-US"/>
           </a:p>
@@ -1235,7 +1235,7 @@
           <a:p>
             <a:fld id="{07096713-FB4A-4B90-A618-3CE2391E76AF}" type="datetimeFigureOut">
               <a:rPr lang="en-US" smtClean="0"/>
-              <a:t>11/16/2024</a:t>
+              <a:t>11/20/2024</a:t>
             </a:fld>
             <a:endParaRPr lang="en-US"/>
           </a:p>
@@ -1510,7 +1510,7 @@
           <a:p>
             <a:fld id="{07096713-FB4A-4B90-A618-3CE2391E76AF}" type="datetimeFigureOut">
               <a:rPr lang="en-US" smtClean="0"/>
-              <a:t>11/16/2024</a:t>
+              <a:t>11/20/2024</a:t>
             </a:fld>
             <a:endParaRPr lang="en-US"/>
           </a:p>
@@ -1775,7 +1775,7 @@
           <a:p>
             <a:fld id="{07096713-FB4A-4B90-A618-3CE2391E76AF}" type="datetimeFigureOut">
               <a:rPr lang="en-US" smtClean="0"/>
-              <a:t>11/16/2024</a:t>
+              <a:t>11/20/2024</a:t>
             </a:fld>
             <a:endParaRPr lang="en-US"/>
           </a:p>
@@ -2187,7 +2187,7 @@
           <a:p>
             <a:fld id="{07096713-FB4A-4B90-A618-3CE2391E76AF}" type="datetimeFigureOut">
               <a:rPr lang="en-US" smtClean="0"/>
-              <a:t>11/16/2024</a:t>
+              <a:t>11/20/2024</a:t>
             </a:fld>
             <a:endParaRPr lang="en-US"/>
           </a:p>
@@ -2328,7 +2328,7 @@
           <a:p>
             <a:fld id="{07096713-FB4A-4B90-A618-3CE2391E76AF}" type="datetimeFigureOut">
               <a:rPr lang="en-US" smtClean="0"/>
-              <a:t>11/16/2024</a:t>
+              <a:t>11/20/2024</a:t>
             </a:fld>
             <a:endParaRPr lang="en-US"/>
           </a:p>
@@ -2441,7 +2441,7 @@
           <a:p>
             <a:fld id="{07096713-FB4A-4B90-A618-3CE2391E76AF}" type="datetimeFigureOut">
               <a:rPr lang="en-US" smtClean="0"/>
-              <a:t>11/16/2024</a:t>
+              <a:t>11/20/2024</a:t>
             </a:fld>
             <a:endParaRPr lang="en-US"/>
           </a:p>
@@ -2752,7 +2752,7 @@
           <a:p>
             <a:fld id="{07096713-FB4A-4B90-A618-3CE2391E76AF}" type="datetimeFigureOut">
               <a:rPr lang="en-US" smtClean="0"/>
-              <a:t>11/16/2024</a:t>
+              <a:t>11/20/2024</a:t>
             </a:fld>
             <a:endParaRPr lang="en-US"/>
           </a:p>
@@ -3040,7 +3040,7 @@
           <a:p>
             <a:fld id="{07096713-FB4A-4B90-A618-3CE2391E76AF}" type="datetimeFigureOut">
               <a:rPr lang="en-US" smtClean="0"/>
-              <a:t>11/16/2024</a:t>
+              <a:t>11/20/2024</a:t>
             </a:fld>
             <a:endParaRPr lang="en-US"/>
           </a:p>
@@ -3281,7 +3281,7 @@
           <a:p>
             <a:fld id="{07096713-FB4A-4B90-A618-3CE2391E76AF}" type="datetimeFigureOut">
               <a:rPr lang="en-US" smtClean="0"/>
-              <a:t>11/16/2024</a:t>
+              <a:t>11/20/2024</a:t>
             </a:fld>
             <a:endParaRPr lang="en-US"/>
           </a:p>
@@ -3713,7 +3713,7 @@
         <p:spPr>
           <a:xfrm>
             <a:off x="1204332" y="2665714"/>
-            <a:ext cx="5383161" cy="461665"/>
+            <a:ext cx="5383161" cy="830997"/>
           </a:xfrm>
           <a:prstGeom prst="rect">
             <a:avLst/>
@@ -3736,7 +3736,26 @@
             </a:r>
             <a:r>
               <a:rPr lang="ko-KR" altLang="en-US" sz="2400" b="1" dirty="0"/>
-              <a:t>요소 많이넣기</a:t>
+              <a:t>요소 </a:t>
+            </a:r>
+            <a:r>
+              <a:rPr lang="ko-KR" altLang="en-US" sz="2400" b="1" dirty="0" err="1"/>
+              <a:t>많이넣기</a:t>
+            </a:r>
+            <a:endParaRPr lang="en-US" altLang="ko-KR" sz="2400" b="1" dirty="0"/>
+          </a:p>
+          <a:p>
+            <a:pPr marL="342900" indent="-342900">
+              <a:buFont typeface="Arial" panose="020B0604020202020204" pitchFamily="34" charset="0"/>
+              <a:buChar char="•"/>
+            </a:pPr>
+            <a:r>
+              <a:rPr lang="ko-KR" altLang="en-US" sz="2400" b="1" dirty="0"/>
+              <a:t>방문자수</a:t>
+            </a:r>
+            <a:r>
+              <a:rPr lang="en-US" altLang="ko-KR" sz="2400" b="1" dirty="0"/>
+              <a:t>?</a:t>
             </a:r>
             <a:endParaRPr lang="en-US" sz="2400" b="1" dirty="0"/>
           </a:p>

</xml_diff>

<commit_message>
feat(auth): implement email verification for sign-up and password recovery feat(profile): add test implementation for user profile screen
</commit_message>
<xml_diff>
--- a/viewDesignSketches.pptx
+++ b/viewDesignSketches.pptx
@@ -217,7 +217,7 @@
           <a:p>
             <a:fld id="{BE985D28-3B0A-42E0-BE9B-05472A281DFA}" type="datetimeFigureOut">
               <a:rPr lang="en-US" smtClean="0"/>
-              <a:t>11/20/2024</a:t>
+              <a:t>11/27/2024</a:t>
             </a:fld>
             <a:endParaRPr lang="en-US"/>
           </a:p>
@@ -631,7 +631,7 @@
           <a:p>
             <a:fld id="{07096713-FB4A-4B90-A618-3CE2391E76AF}" type="datetimeFigureOut">
               <a:rPr lang="en-US" smtClean="0"/>
-              <a:t>11/20/2024</a:t>
+              <a:t>11/27/2024</a:t>
             </a:fld>
             <a:endParaRPr lang="en-US"/>
           </a:p>
@@ -829,7 +829,7 @@
           <a:p>
             <a:fld id="{07096713-FB4A-4B90-A618-3CE2391E76AF}" type="datetimeFigureOut">
               <a:rPr lang="en-US" smtClean="0"/>
-              <a:t>11/20/2024</a:t>
+              <a:t>11/27/2024</a:t>
             </a:fld>
             <a:endParaRPr lang="en-US"/>
           </a:p>
@@ -1037,7 +1037,7 @@
           <a:p>
             <a:fld id="{07096713-FB4A-4B90-A618-3CE2391E76AF}" type="datetimeFigureOut">
               <a:rPr lang="en-US" smtClean="0"/>
-              <a:t>11/20/2024</a:t>
+              <a:t>11/27/2024</a:t>
             </a:fld>
             <a:endParaRPr lang="en-US"/>
           </a:p>
@@ -1235,7 +1235,7 @@
           <a:p>
             <a:fld id="{07096713-FB4A-4B90-A618-3CE2391E76AF}" type="datetimeFigureOut">
               <a:rPr lang="en-US" smtClean="0"/>
-              <a:t>11/20/2024</a:t>
+              <a:t>11/27/2024</a:t>
             </a:fld>
             <a:endParaRPr lang="en-US"/>
           </a:p>
@@ -1510,7 +1510,7 @@
           <a:p>
             <a:fld id="{07096713-FB4A-4B90-A618-3CE2391E76AF}" type="datetimeFigureOut">
               <a:rPr lang="en-US" smtClean="0"/>
-              <a:t>11/20/2024</a:t>
+              <a:t>11/27/2024</a:t>
             </a:fld>
             <a:endParaRPr lang="en-US"/>
           </a:p>
@@ -1775,7 +1775,7 @@
           <a:p>
             <a:fld id="{07096713-FB4A-4B90-A618-3CE2391E76AF}" type="datetimeFigureOut">
               <a:rPr lang="en-US" smtClean="0"/>
-              <a:t>11/20/2024</a:t>
+              <a:t>11/27/2024</a:t>
             </a:fld>
             <a:endParaRPr lang="en-US"/>
           </a:p>
@@ -2187,7 +2187,7 @@
           <a:p>
             <a:fld id="{07096713-FB4A-4B90-A618-3CE2391E76AF}" type="datetimeFigureOut">
               <a:rPr lang="en-US" smtClean="0"/>
-              <a:t>11/20/2024</a:t>
+              <a:t>11/27/2024</a:t>
             </a:fld>
             <a:endParaRPr lang="en-US"/>
           </a:p>
@@ -2328,7 +2328,7 @@
           <a:p>
             <a:fld id="{07096713-FB4A-4B90-A618-3CE2391E76AF}" type="datetimeFigureOut">
               <a:rPr lang="en-US" smtClean="0"/>
-              <a:t>11/20/2024</a:t>
+              <a:t>11/27/2024</a:t>
             </a:fld>
             <a:endParaRPr lang="en-US"/>
           </a:p>
@@ -2441,7 +2441,7 @@
           <a:p>
             <a:fld id="{07096713-FB4A-4B90-A618-3CE2391E76AF}" type="datetimeFigureOut">
               <a:rPr lang="en-US" smtClean="0"/>
-              <a:t>11/20/2024</a:t>
+              <a:t>11/27/2024</a:t>
             </a:fld>
             <a:endParaRPr lang="en-US"/>
           </a:p>
@@ -2752,7 +2752,7 @@
           <a:p>
             <a:fld id="{07096713-FB4A-4B90-A618-3CE2391E76AF}" type="datetimeFigureOut">
               <a:rPr lang="en-US" smtClean="0"/>
-              <a:t>11/20/2024</a:t>
+              <a:t>11/27/2024</a:t>
             </a:fld>
             <a:endParaRPr lang="en-US"/>
           </a:p>
@@ -3040,7 +3040,7 @@
           <a:p>
             <a:fld id="{07096713-FB4A-4B90-A618-3CE2391E76AF}" type="datetimeFigureOut">
               <a:rPr lang="en-US" smtClean="0"/>
-              <a:t>11/20/2024</a:t>
+              <a:t>11/27/2024</a:t>
             </a:fld>
             <a:endParaRPr lang="en-US"/>
           </a:p>
@@ -3281,7 +3281,7 @@
           <a:p>
             <a:fld id="{07096713-FB4A-4B90-A618-3CE2391E76AF}" type="datetimeFigureOut">
               <a:rPr lang="en-US" smtClean="0"/>
-              <a:t>11/20/2024</a:t>
+              <a:t>11/27/2024</a:t>
             </a:fld>
             <a:endParaRPr lang="en-US"/>
           </a:p>
@@ -42789,10 +42789,33 @@
             <a:off x="753387" y="1314232"/>
             <a:ext cx="1474115" cy="1474115"/>
           </a:xfrm>
-          <a:prstGeom prst="rect">
+          <a:prstGeom prst="ellipse">
             <a:avLst/>
           </a:prstGeom>
-          <a:noFill/>
+          <a:ln w="63500" cap="rnd">
+            <a:solidFill>
+              <a:srgbClr val="333333"/>
+            </a:solidFill>
+          </a:ln>
+          <a:effectLst>
+            <a:outerShdw blurRad="381000" dist="292100" dir="5400000" sx="-80000" sy="-18000" rotWithShape="0">
+              <a:srgbClr val="000000">
+                <a:alpha val="22000"/>
+              </a:srgbClr>
+            </a:outerShdw>
+          </a:effectLst>
+          <a:scene3d>
+            <a:camera prst="orthographicFront"/>
+            <a:lightRig rig="contrasting" dir="t">
+              <a:rot lat="0" lon="0" rev="3000000"/>
+            </a:lightRig>
+          </a:scene3d>
+          <a:sp3d contourW="7620">
+            <a:bevelT w="95250" h="31750"/>
+            <a:contourClr>
+              <a:srgbClr val="333333"/>
+            </a:contourClr>
+          </a:sp3d>
           <a:extLst>
             <a:ext uri="{909E8E84-426E-40DD-AFC4-6F175D3DCCD1}">
               <a14:hiddenFill xmlns:a14="http://schemas.microsoft.com/office/drawing/2010/main">
@@ -43084,8 +43107,8 @@
         </p:nvSpPr>
         <p:spPr>
           <a:xfrm>
-            <a:off x="523105" y="3776502"/>
-            <a:ext cx="1934678" cy="276999"/>
+            <a:off x="344488" y="3792867"/>
+            <a:ext cx="2220095" cy="276999"/>
           </a:xfrm>
           <a:prstGeom prst="rect">
             <a:avLst/>
@@ -43101,7 +43124,7 @@
             <a:pPr algn="ctr"/>
             <a:r>
               <a:rPr lang="ko-KR" altLang="en-US" sz="1200" b="1" dirty="0"/>
-              <a:t>나락도 락이다</a:t>
+              <a:t>그냥 살아요</a:t>
             </a:r>
             <a:endParaRPr lang="en-US" altLang="ko-KR" sz="1200" b="1" dirty="0"/>
           </a:p>

</xml_diff>